<commit_message>
uploading the pdf file
</commit_message>
<xml_diff>
--- a/LENDING_CLUB_CASE_STUDY.pptx
+++ b/LENDING_CLUB_CASE_STUDY.pptx
@@ -1,57 +1,48 @@
 
 <file path=ppt/presentation.xml><?xml version="1.0" encoding="utf-8"?>
-<p:presentation xmlns:a="http://schemas.openxmlformats.org/drawingml/2006/main" xmlns:r="http://schemas.openxmlformats.org/officeDocument/2006/relationships" xmlns:p="http://schemas.openxmlformats.org/presentationml/2006/main" saveSubsetFonts="1" embedTrueTypeFonts="true">
+<p:presentation xmlns:a="http://schemas.openxmlformats.org/drawingml/2006/main" xmlns:r="http://schemas.openxmlformats.org/officeDocument/2006/relationships" xmlns:p="http://schemas.openxmlformats.org/presentationml/2006/main" embedTrueTypeFonts="1" saveSubsetFonts="1">
   <p:sldMasterIdLst>
     <p:sldMasterId id="2147483648" r:id="rId1"/>
   </p:sldMasterIdLst>
   <p:sldIdLst>
-    <p:sldId id="256" r:id="rId15"/>
-    <p:sldId id="257" r:id="rId16"/>
-    <p:sldId id="258" r:id="rId17"/>
-    <p:sldId id="259" r:id="rId18"/>
-    <p:sldId id="260" r:id="rId19"/>
-    <p:sldId id="261" r:id="rId20"/>
-    <p:sldId id="262" r:id="rId21"/>
-    <p:sldId id="263" r:id="rId22"/>
+    <p:sldId id="256" r:id="rId2"/>
+    <p:sldId id="257" r:id="rId3"/>
+    <p:sldId id="258" r:id="rId4"/>
+    <p:sldId id="259" r:id="rId5"/>
+    <p:sldId id="260" r:id="rId6"/>
+    <p:sldId id="261" r:id="rId7"/>
+    <p:sldId id="262" r:id="rId8"/>
+    <p:sldId id="263" r:id="rId9"/>
   </p:sldIdLst>
   <p:sldSz cx="18288000" cy="10287000"/>
   <p:notesSz cx="6858000" cy="9144000"/>
   <p:embeddedFontLst>
     <p:embeddedFont>
-      <p:font typeface="Prata" charset="1" panose="00000500000000000000"/>
-      <p:regular r:id="rId6"/>
-    </p:embeddedFont>
-    <p:embeddedFont>
-      <p:font typeface="Raleway" charset="1" panose="020B0503030101060003"/>
-      <p:regular r:id="rId7"/>
-    </p:embeddedFont>
-    <p:embeddedFont>
-      <p:font typeface="Raleway Bold" charset="1" panose="020B0803030101060003"/>
-      <p:regular r:id="rId8"/>
-    </p:embeddedFont>
-    <p:embeddedFont>
-      <p:font typeface="Arimo" charset="1" panose="020B0604020202020204"/>
-      <p:regular r:id="rId9"/>
-    </p:embeddedFont>
-    <p:embeddedFont>
-      <p:font typeface="Arimo Bold" charset="1" panose="020B0704020202020204"/>
+      <p:font typeface="Arimo" panose="020B0604020202020204" charset="0"/>
       <p:regular r:id="rId10"/>
     </p:embeddedFont>
     <p:embeddedFont>
-      <p:font typeface="Arimo Italics" charset="1" panose="020B0604020202090204"/>
+      <p:font typeface="Arimo Bold" panose="020B0604020202020204" charset="0"/>
       <p:regular r:id="rId11"/>
     </p:embeddedFont>
     <p:embeddedFont>
-      <p:font typeface="Arimo Bold Italics" charset="1" panose="020B0704020202090204"/>
+      <p:font typeface="Calibri" panose="020F0502020204030204" pitchFamily="34" charset="0"/>
       <p:regular r:id="rId12"/>
+      <p:bold r:id="rId13"/>
+      <p:italic r:id="rId14"/>
+      <p:boldItalic r:id="rId15"/>
     </p:embeddedFont>
     <p:embeddedFont>
-      <p:font typeface="Radley" charset="1" panose="00000500000000000000"/>
-      <p:regular r:id="rId13"/>
+      <p:font typeface="Radley" panose="020B0604020202020204" charset="0"/>
+      <p:regular r:id="rId16"/>
     </p:embeddedFont>
     <p:embeddedFont>
-      <p:font typeface="Radley Italics" charset="1" panose="00000500000000000000"/>
-      <p:regular r:id="rId14"/>
+      <p:font typeface="Raleway" pitchFamily="2" charset="0"/>
+      <p:regular r:id="rId17"/>
+    </p:embeddedFont>
+    <p:embeddedFont>
+      <p:font typeface="Raleway Bold" panose="020B0604020202020204" charset="0"/>
+      <p:regular r:id="rId18"/>
     </p:embeddedFont>
   </p:embeddedFontLst>
   <p:defaultTextStyle>
@@ -149,6 +140,22 @@
       </a:defRPr>
     </a:lvl9pPr>
   </p:defaultTextStyle>
+  <p:extLst>
+    <p:ext uri="{EFAFB233-063F-42B5-8137-9DF3F51BA10A}">
+      <p15:sldGuideLst xmlns:p15="http://schemas.microsoft.com/office/powerpoint/2012/main">
+        <p15:guide id="1" orient="horz" pos="2160">
+          <p15:clr>
+            <a:srgbClr val="A4A3A4"/>
+          </p15:clr>
+        </p15:guide>
+        <p15:guide id="2" pos="2880">
+          <p15:clr>
+            <a:srgbClr val="A4A3A4"/>
+          </p15:clr>
+        </p15:guide>
+      </p15:sldGuideLst>
+    </p:ext>
+  </p:extLst>
 </p:presentation>
 </file>
 
@@ -190,10 +197,9 @@
           <a:lstStyle/>
           <a:p>
             <a:r>
-              <a:rPr lang="en-US" smtClean="0"/>
+              <a:rPr lang="en-US"/>
               <a:t>Click to edit Master title style</a:t>
             </a:r>
-            <a:endParaRPr lang="en-US"/>
           </a:p>
         </p:txBody>
       </p:sp>
@@ -309,10 +315,9 @@
           </a:lstStyle>
           <a:p>
             <a:r>
-              <a:rPr lang="en-US" smtClean="0"/>
+              <a:rPr lang="en-US"/>
               <a:t>Click to edit Master subtitle style</a:t>
             </a:r>
-            <a:endParaRPr lang="en-US"/>
           </a:p>
         </p:txBody>
       </p:sp>
@@ -334,7 +339,7 @@
             <a:fld id="{1D8BD707-D9CF-40AE-B4C6-C98DA3205C09}" type="datetimeFigureOut">
               <a:rPr lang="en-US" smtClean="0"/>
               <a:pPr/>
-              <a:t>8/1/2011</a:t>
+              <a:t>3/9/2022</a:t>
             </a:fld>
             <a:endParaRPr lang="en-US"/>
           </a:p>
@@ -424,10 +429,9 @@
           <a:lstStyle/>
           <a:p>
             <a:r>
-              <a:rPr lang="en-US" smtClean="0"/>
+              <a:rPr lang="en-US"/>
               <a:t>Click to edit Master title style</a:t>
             </a:r>
-            <a:endParaRPr lang="en-US"/>
           </a:p>
         </p:txBody>
       </p:sp>
@@ -448,38 +452,37 @@
           <a:p>
             <a:pPr lvl="0"/>
             <a:r>
-              <a:rPr lang="en-US" smtClean="0"/>
+              <a:rPr lang="en-US"/>
               <a:t>Click to edit Master text styles</a:t>
             </a:r>
           </a:p>
           <a:p>
             <a:pPr lvl="1"/>
             <a:r>
-              <a:rPr lang="en-US" smtClean="0"/>
+              <a:rPr lang="en-US"/>
               <a:t>Second level</a:t>
             </a:r>
           </a:p>
           <a:p>
             <a:pPr lvl="2"/>
             <a:r>
-              <a:rPr lang="en-US" smtClean="0"/>
+              <a:rPr lang="en-US"/>
               <a:t>Third level</a:t>
             </a:r>
           </a:p>
           <a:p>
             <a:pPr lvl="3"/>
             <a:r>
-              <a:rPr lang="en-US" smtClean="0"/>
+              <a:rPr lang="en-US"/>
               <a:t>Fourth level</a:t>
             </a:r>
           </a:p>
           <a:p>
             <a:pPr lvl="4"/>
             <a:r>
-              <a:rPr lang="en-US" smtClean="0"/>
+              <a:rPr lang="en-US"/>
               <a:t>Fifth level</a:t>
             </a:r>
-            <a:endParaRPr lang="en-US"/>
           </a:p>
         </p:txBody>
       </p:sp>
@@ -501,7 +504,7 @@
             <a:fld id="{1D8BD707-D9CF-40AE-B4C6-C98DA3205C09}" type="datetimeFigureOut">
               <a:rPr lang="en-US" smtClean="0"/>
               <a:pPr/>
-              <a:t>8/1/2011</a:t>
+              <a:t>3/9/2022</a:t>
             </a:fld>
             <a:endParaRPr lang="en-US"/>
           </a:p>
@@ -596,10 +599,9 @@
           <a:lstStyle/>
           <a:p>
             <a:r>
-              <a:rPr lang="en-US" smtClean="0"/>
+              <a:rPr lang="en-US"/>
               <a:t>Click to edit Master title style</a:t>
             </a:r>
-            <a:endParaRPr lang="en-US"/>
           </a:p>
         </p:txBody>
       </p:sp>
@@ -625,38 +627,37 @@
           <a:p>
             <a:pPr lvl="0"/>
             <a:r>
-              <a:rPr lang="en-US" smtClean="0"/>
+              <a:rPr lang="en-US"/>
               <a:t>Click to edit Master text styles</a:t>
             </a:r>
           </a:p>
           <a:p>
             <a:pPr lvl="1"/>
             <a:r>
-              <a:rPr lang="en-US" smtClean="0"/>
+              <a:rPr lang="en-US"/>
               <a:t>Second level</a:t>
             </a:r>
           </a:p>
           <a:p>
             <a:pPr lvl="2"/>
             <a:r>
-              <a:rPr lang="en-US" smtClean="0"/>
+              <a:rPr lang="en-US"/>
               <a:t>Third level</a:t>
             </a:r>
           </a:p>
           <a:p>
             <a:pPr lvl="3"/>
             <a:r>
-              <a:rPr lang="en-US" smtClean="0"/>
+              <a:rPr lang="en-US"/>
               <a:t>Fourth level</a:t>
             </a:r>
           </a:p>
           <a:p>
             <a:pPr lvl="4"/>
             <a:r>
-              <a:rPr lang="en-US" smtClean="0"/>
+              <a:rPr lang="en-US"/>
               <a:t>Fifth level</a:t>
             </a:r>
-            <a:endParaRPr lang="en-US"/>
           </a:p>
         </p:txBody>
       </p:sp>
@@ -678,7 +679,7 @@
             <a:fld id="{1D8BD707-D9CF-40AE-B4C6-C98DA3205C09}" type="datetimeFigureOut">
               <a:rPr lang="en-US" smtClean="0"/>
               <a:pPr/>
-              <a:t>8/1/2011</a:t>
+              <a:t>3/9/2022</a:t>
             </a:fld>
             <a:endParaRPr lang="en-US"/>
           </a:p>
@@ -768,10 +769,9 @@
           <a:lstStyle/>
           <a:p>
             <a:r>
-              <a:rPr lang="en-US" smtClean="0"/>
+              <a:rPr lang="en-US"/>
               <a:t>Click to edit Master title style</a:t>
             </a:r>
-            <a:endParaRPr lang="en-US"/>
           </a:p>
         </p:txBody>
       </p:sp>
@@ -792,38 +792,37 @@
           <a:p>
             <a:pPr lvl="0"/>
             <a:r>
-              <a:rPr lang="en-US" smtClean="0"/>
+              <a:rPr lang="en-US"/>
               <a:t>Click to edit Master text styles</a:t>
             </a:r>
           </a:p>
           <a:p>
             <a:pPr lvl="1"/>
             <a:r>
-              <a:rPr lang="en-US" smtClean="0"/>
+              <a:rPr lang="en-US"/>
               <a:t>Second level</a:t>
             </a:r>
           </a:p>
           <a:p>
             <a:pPr lvl="2"/>
             <a:r>
-              <a:rPr lang="en-US" smtClean="0"/>
+              <a:rPr lang="en-US"/>
               <a:t>Third level</a:t>
             </a:r>
           </a:p>
           <a:p>
             <a:pPr lvl="3"/>
             <a:r>
-              <a:rPr lang="en-US" smtClean="0"/>
+              <a:rPr lang="en-US"/>
               <a:t>Fourth level</a:t>
             </a:r>
           </a:p>
           <a:p>
             <a:pPr lvl="4"/>
             <a:r>
-              <a:rPr lang="en-US" smtClean="0"/>
+              <a:rPr lang="en-US"/>
               <a:t>Fifth level</a:t>
             </a:r>
-            <a:endParaRPr lang="en-US"/>
           </a:p>
         </p:txBody>
       </p:sp>
@@ -845,7 +844,7 @@
             <a:fld id="{1D8BD707-D9CF-40AE-B4C6-C98DA3205C09}" type="datetimeFigureOut">
               <a:rPr lang="en-US" smtClean="0"/>
               <a:pPr/>
-              <a:t>8/1/2011</a:t>
+              <a:t>3/9/2022</a:t>
             </a:fld>
             <a:endParaRPr lang="en-US"/>
           </a:p>
@@ -944,10 +943,9 @@
           </a:lstStyle>
           <a:p>
             <a:r>
-              <a:rPr lang="en-US" smtClean="0"/>
+              <a:rPr lang="en-US"/>
               <a:t>Click to edit Master title style</a:t>
             </a:r>
-            <a:endParaRPr lang="en-US"/>
           </a:p>
         </p:txBody>
       </p:sp>
@@ -1064,7 +1062,7 @@
           <a:p>
             <a:pPr lvl="0"/>
             <a:r>
-              <a:rPr lang="en-US" smtClean="0"/>
+              <a:rPr lang="en-US"/>
               <a:t>Click to edit Master text styles</a:t>
             </a:r>
           </a:p>
@@ -1088,7 +1086,7 @@
             <a:fld id="{1D8BD707-D9CF-40AE-B4C6-C98DA3205C09}" type="datetimeFigureOut">
               <a:rPr lang="en-US" smtClean="0"/>
               <a:pPr/>
-              <a:t>8/1/2011</a:t>
+              <a:t>3/9/2022</a:t>
             </a:fld>
             <a:endParaRPr lang="en-US"/>
           </a:p>
@@ -1178,10 +1176,9 @@
           <a:lstStyle/>
           <a:p>
             <a:r>
-              <a:rPr lang="en-US" smtClean="0"/>
+              <a:rPr lang="en-US"/>
               <a:t>Click to edit Master title style</a:t>
             </a:r>
-            <a:endParaRPr lang="en-US"/>
           </a:p>
         </p:txBody>
       </p:sp>
@@ -1235,38 +1232,37 @@
           <a:p>
             <a:pPr lvl="0"/>
             <a:r>
-              <a:rPr lang="en-US" smtClean="0"/>
+              <a:rPr lang="en-US"/>
               <a:t>Click to edit Master text styles</a:t>
             </a:r>
           </a:p>
           <a:p>
             <a:pPr lvl="1"/>
             <a:r>
-              <a:rPr lang="en-US" smtClean="0"/>
+              <a:rPr lang="en-US"/>
               <a:t>Second level</a:t>
             </a:r>
           </a:p>
           <a:p>
             <a:pPr lvl="2"/>
             <a:r>
-              <a:rPr lang="en-US" smtClean="0"/>
+              <a:rPr lang="en-US"/>
               <a:t>Third level</a:t>
             </a:r>
           </a:p>
           <a:p>
             <a:pPr lvl="3"/>
             <a:r>
-              <a:rPr lang="en-US" smtClean="0"/>
+              <a:rPr lang="en-US"/>
               <a:t>Fourth level</a:t>
             </a:r>
           </a:p>
           <a:p>
             <a:pPr lvl="4"/>
             <a:r>
-              <a:rPr lang="en-US" smtClean="0"/>
+              <a:rPr lang="en-US"/>
               <a:t>Fifth level</a:t>
             </a:r>
-            <a:endParaRPr lang="en-US"/>
           </a:p>
         </p:txBody>
       </p:sp>
@@ -1320,38 +1316,37 @@
           <a:p>
             <a:pPr lvl="0"/>
             <a:r>
-              <a:rPr lang="en-US" smtClean="0"/>
+              <a:rPr lang="en-US"/>
               <a:t>Click to edit Master text styles</a:t>
             </a:r>
           </a:p>
           <a:p>
             <a:pPr lvl="1"/>
             <a:r>
-              <a:rPr lang="en-US" smtClean="0"/>
+              <a:rPr lang="en-US"/>
               <a:t>Second level</a:t>
             </a:r>
           </a:p>
           <a:p>
             <a:pPr lvl="2"/>
             <a:r>
-              <a:rPr lang="en-US" smtClean="0"/>
+              <a:rPr lang="en-US"/>
               <a:t>Third level</a:t>
             </a:r>
           </a:p>
           <a:p>
             <a:pPr lvl="3"/>
             <a:r>
-              <a:rPr lang="en-US" smtClean="0"/>
+              <a:rPr lang="en-US"/>
               <a:t>Fourth level</a:t>
             </a:r>
           </a:p>
           <a:p>
             <a:pPr lvl="4"/>
             <a:r>
-              <a:rPr lang="en-US" smtClean="0"/>
+              <a:rPr lang="en-US"/>
               <a:t>Fifth level</a:t>
             </a:r>
-            <a:endParaRPr lang="en-US"/>
           </a:p>
         </p:txBody>
       </p:sp>
@@ -1373,7 +1368,7 @@
             <a:fld id="{1D8BD707-D9CF-40AE-B4C6-C98DA3205C09}" type="datetimeFigureOut">
               <a:rPr lang="en-US" smtClean="0"/>
               <a:pPr/>
-              <a:t>8/1/2011</a:t>
+              <a:t>3/9/2022</a:t>
             </a:fld>
             <a:endParaRPr lang="en-US"/>
           </a:p>
@@ -1467,10 +1462,9 @@
           </a:lstStyle>
           <a:p>
             <a:r>
-              <a:rPr lang="en-US" smtClean="0"/>
+              <a:rPr lang="en-US"/>
               <a:t>Click to edit Master title style</a:t>
             </a:r>
-            <a:endParaRPr lang="en-US"/>
           </a:p>
         </p:txBody>
       </p:sp>
@@ -1533,7 +1527,7 @@
           <a:p>
             <a:pPr lvl="0"/>
             <a:r>
-              <a:rPr lang="en-US" smtClean="0"/>
+              <a:rPr lang="en-US"/>
               <a:t>Click to edit Master text styles</a:t>
             </a:r>
           </a:p>
@@ -1589,38 +1583,37 @@
           <a:p>
             <a:pPr lvl="0"/>
             <a:r>
-              <a:rPr lang="en-US" smtClean="0"/>
+              <a:rPr lang="en-US"/>
               <a:t>Click to edit Master text styles</a:t>
             </a:r>
           </a:p>
           <a:p>
             <a:pPr lvl="1"/>
             <a:r>
-              <a:rPr lang="en-US" smtClean="0"/>
+              <a:rPr lang="en-US"/>
               <a:t>Second level</a:t>
             </a:r>
           </a:p>
           <a:p>
             <a:pPr lvl="2"/>
             <a:r>
-              <a:rPr lang="en-US" smtClean="0"/>
+              <a:rPr lang="en-US"/>
               <a:t>Third level</a:t>
             </a:r>
           </a:p>
           <a:p>
             <a:pPr lvl="3"/>
             <a:r>
-              <a:rPr lang="en-US" smtClean="0"/>
+              <a:rPr lang="en-US"/>
               <a:t>Fourth level</a:t>
             </a:r>
           </a:p>
           <a:p>
             <a:pPr lvl="4"/>
             <a:r>
-              <a:rPr lang="en-US" smtClean="0"/>
+              <a:rPr lang="en-US"/>
               <a:t>Fifth level</a:t>
             </a:r>
-            <a:endParaRPr lang="en-US"/>
           </a:p>
         </p:txBody>
       </p:sp>
@@ -1683,7 +1676,7 @@
           <a:p>
             <a:pPr lvl="0"/>
             <a:r>
-              <a:rPr lang="en-US" smtClean="0"/>
+              <a:rPr lang="en-US"/>
               <a:t>Click to edit Master text styles</a:t>
             </a:r>
           </a:p>
@@ -1739,38 +1732,37 @@
           <a:p>
             <a:pPr lvl="0"/>
             <a:r>
-              <a:rPr lang="en-US" smtClean="0"/>
+              <a:rPr lang="en-US"/>
               <a:t>Click to edit Master text styles</a:t>
             </a:r>
           </a:p>
           <a:p>
             <a:pPr lvl="1"/>
             <a:r>
-              <a:rPr lang="en-US" smtClean="0"/>
+              <a:rPr lang="en-US"/>
               <a:t>Second level</a:t>
             </a:r>
           </a:p>
           <a:p>
             <a:pPr lvl="2"/>
             <a:r>
-              <a:rPr lang="en-US" smtClean="0"/>
+              <a:rPr lang="en-US"/>
               <a:t>Third level</a:t>
             </a:r>
           </a:p>
           <a:p>
             <a:pPr lvl="3"/>
             <a:r>
-              <a:rPr lang="en-US" smtClean="0"/>
+              <a:rPr lang="en-US"/>
               <a:t>Fourth level</a:t>
             </a:r>
           </a:p>
           <a:p>
             <a:pPr lvl="4"/>
             <a:r>
-              <a:rPr lang="en-US" smtClean="0"/>
+              <a:rPr lang="en-US"/>
               <a:t>Fifth level</a:t>
             </a:r>
-            <a:endParaRPr lang="en-US"/>
           </a:p>
         </p:txBody>
       </p:sp>
@@ -1792,7 +1784,7 @@
             <a:fld id="{1D8BD707-D9CF-40AE-B4C6-C98DA3205C09}" type="datetimeFigureOut">
               <a:rPr lang="en-US" smtClean="0"/>
               <a:pPr/>
-              <a:t>8/1/2011</a:t>
+              <a:t>3/9/2022</a:t>
             </a:fld>
             <a:endParaRPr lang="en-US"/>
           </a:p>
@@ -1882,10 +1874,9 @@
           <a:lstStyle/>
           <a:p>
             <a:r>
-              <a:rPr lang="en-US" smtClean="0"/>
+              <a:rPr lang="en-US"/>
               <a:t>Click to edit Master title style</a:t>
             </a:r>
-            <a:endParaRPr lang="en-US"/>
           </a:p>
         </p:txBody>
       </p:sp>
@@ -1907,7 +1898,7 @@
             <a:fld id="{1D8BD707-D9CF-40AE-B4C6-C98DA3205C09}" type="datetimeFigureOut">
               <a:rPr lang="en-US" smtClean="0"/>
               <a:pPr/>
-              <a:t>8/1/2011</a:t>
+              <a:t>3/9/2022</a:t>
             </a:fld>
             <a:endParaRPr lang="en-US"/>
           </a:p>
@@ -1999,7 +1990,7 @@
             <a:fld id="{1D8BD707-D9CF-40AE-B4C6-C98DA3205C09}" type="datetimeFigureOut">
               <a:rPr lang="en-US" smtClean="0"/>
               <a:pPr/>
-              <a:t>8/1/2011</a:t>
+              <a:t>3/9/2022</a:t>
             </a:fld>
             <a:endParaRPr lang="en-US"/>
           </a:p>
@@ -2098,10 +2089,9 @@
           </a:lstStyle>
           <a:p>
             <a:r>
-              <a:rPr lang="en-US" smtClean="0"/>
+              <a:rPr lang="en-US"/>
               <a:t>Click to edit Master title style</a:t>
             </a:r>
-            <a:endParaRPr lang="en-US"/>
           </a:p>
         </p:txBody>
       </p:sp>
@@ -2155,38 +2145,37 @@
           <a:p>
             <a:pPr lvl="0"/>
             <a:r>
-              <a:rPr lang="en-US" smtClean="0"/>
+              <a:rPr lang="en-US"/>
               <a:t>Click to edit Master text styles</a:t>
             </a:r>
           </a:p>
           <a:p>
             <a:pPr lvl="1"/>
             <a:r>
-              <a:rPr lang="en-US" smtClean="0"/>
+              <a:rPr lang="en-US"/>
               <a:t>Second level</a:t>
             </a:r>
           </a:p>
           <a:p>
             <a:pPr lvl="2"/>
             <a:r>
-              <a:rPr lang="en-US" smtClean="0"/>
+              <a:rPr lang="en-US"/>
               <a:t>Third level</a:t>
             </a:r>
           </a:p>
           <a:p>
             <a:pPr lvl="3"/>
             <a:r>
-              <a:rPr lang="en-US" smtClean="0"/>
+              <a:rPr lang="en-US"/>
               <a:t>Fourth level</a:t>
             </a:r>
           </a:p>
           <a:p>
             <a:pPr lvl="4"/>
             <a:r>
-              <a:rPr lang="en-US" smtClean="0"/>
+              <a:rPr lang="en-US"/>
               <a:t>Fifth level</a:t>
             </a:r>
-            <a:endParaRPr lang="en-US"/>
           </a:p>
         </p:txBody>
       </p:sp>
@@ -2249,7 +2238,7 @@
           <a:p>
             <a:pPr lvl="0"/>
             <a:r>
-              <a:rPr lang="en-US" smtClean="0"/>
+              <a:rPr lang="en-US"/>
               <a:t>Click to edit Master text styles</a:t>
             </a:r>
           </a:p>
@@ -2273,7 +2262,7 @@
             <a:fld id="{1D8BD707-D9CF-40AE-B4C6-C98DA3205C09}" type="datetimeFigureOut">
               <a:rPr lang="en-US" smtClean="0"/>
               <a:pPr/>
-              <a:t>8/1/2011</a:t>
+              <a:t>3/9/2022</a:t>
             </a:fld>
             <a:endParaRPr lang="en-US"/>
           </a:p>
@@ -2372,10 +2361,9 @@
           </a:lstStyle>
           <a:p>
             <a:r>
-              <a:rPr lang="en-US" smtClean="0"/>
+              <a:rPr lang="en-US"/>
               <a:t>Click to edit Master title style</a:t>
             </a:r>
-            <a:endParaRPr lang="en-US"/>
           </a:p>
         </p:txBody>
       </p:sp>
@@ -2499,7 +2487,7 @@
           <a:p>
             <a:pPr lvl="0"/>
             <a:r>
-              <a:rPr lang="en-US" smtClean="0"/>
+              <a:rPr lang="en-US"/>
               <a:t>Click to edit Master text styles</a:t>
             </a:r>
           </a:p>
@@ -2523,7 +2511,7 @@
             <a:fld id="{1D8BD707-D9CF-40AE-B4C6-C98DA3205C09}" type="datetimeFigureOut">
               <a:rPr lang="en-US" smtClean="0"/>
               <a:pPr/>
-              <a:t>8/1/2011</a:t>
+              <a:t>3/9/2022</a:t>
             </a:fld>
             <a:endParaRPr lang="en-US"/>
           </a:p>
@@ -2628,10 +2616,9 @@
           <a:lstStyle/>
           <a:p>
             <a:r>
-              <a:rPr lang="en-US" smtClean="0"/>
+              <a:rPr lang="en-US"/>
               <a:t>Click to edit Master title style</a:t>
             </a:r>
-            <a:endParaRPr lang="en-US"/>
           </a:p>
         </p:txBody>
       </p:sp>
@@ -2662,38 +2649,37 @@
           <a:p>
             <a:pPr lvl="0"/>
             <a:r>
-              <a:rPr lang="en-US" smtClean="0"/>
+              <a:rPr lang="en-US"/>
               <a:t>Click to edit Master text styles</a:t>
             </a:r>
           </a:p>
           <a:p>
             <a:pPr lvl="1"/>
             <a:r>
-              <a:rPr lang="en-US" smtClean="0"/>
+              <a:rPr lang="en-US"/>
               <a:t>Second level</a:t>
             </a:r>
           </a:p>
           <a:p>
             <a:pPr lvl="2"/>
             <a:r>
-              <a:rPr lang="en-US" smtClean="0"/>
+              <a:rPr lang="en-US"/>
               <a:t>Third level</a:t>
             </a:r>
           </a:p>
           <a:p>
             <a:pPr lvl="3"/>
             <a:r>
-              <a:rPr lang="en-US" smtClean="0"/>
+              <a:rPr lang="en-US"/>
               <a:t>Fourth level</a:t>
             </a:r>
           </a:p>
           <a:p>
             <a:pPr lvl="4"/>
             <a:r>
-              <a:rPr lang="en-US" smtClean="0"/>
+              <a:rPr lang="en-US"/>
               <a:t>Fifth level</a:t>
             </a:r>
-            <a:endParaRPr lang="en-US"/>
           </a:p>
         </p:txBody>
       </p:sp>
@@ -2733,7 +2719,7 @@
             <a:fld id="{1D8BD707-D9CF-40AE-B4C6-C98DA3205C09}" type="datetimeFigureOut">
               <a:rPr lang="en-US" smtClean="0"/>
               <a:pPr/>
-              <a:t>8/1/2011</a:t>
+              <a:t>3/9/2022</a:t>
             </a:fld>
             <a:endParaRPr lang="en-US"/>
           </a:p>
@@ -3088,13 +3074,14 @@
 </file>
 
 <file path=ppt/slides/slide1.xml><?xml version="1.0" encoding="utf-8"?>
-<p:sld xmlns:p="http://schemas.openxmlformats.org/presentationml/2006/main" xmlns:a="http://schemas.openxmlformats.org/drawingml/2006/main">
+<p:sld xmlns:a="http://schemas.openxmlformats.org/drawingml/2006/main" xmlns:r="http://schemas.openxmlformats.org/officeDocument/2006/relationships" xmlns:p="http://schemas.openxmlformats.org/presentationml/2006/main">
   <p:cSld>
     <p:bg>
       <p:bgPr>
         <a:solidFill>
           <a:srgbClr val="EDE0D4"/>
         </a:solidFill>
+        <a:effectLst/>
       </p:bgPr>
     </p:bg>
     <p:spTree>
@@ -3113,12 +3100,12 @@
       </p:grpSpPr>
       <p:sp>
         <p:nvSpPr>
-          <p:cNvPr name="TextBox 2" id="2"/>
-          <p:cNvSpPr txBox="true"/>
+          <p:cNvPr id="2" name="TextBox 2"/>
+          <p:cNvSpPr txBox="1"/>
           <p:nvPr/>
         </p:nvSpPr>
         <p:spPr>
-          <a:xfrm rot="0">
+          <a:xfrm>
             <a:off x="1028700" y="3695700"/>
             <a:ext cx="14745813" cy="3124200"/>
           </a:xfrm>
@@ -3127,7 +3114,7 @@
           </a:prstGeom>
         </p:spPr>
         <p:txBody>
-          <a:bodyPr anchor="t" rtlCol="false" tIns="0" lIns="0" bIns="0" rIns="0">
+          <a:bodyPr lIns="0" tIns="0" rIns="0" bIns="0" rtlCol="0" anchor="t">
             <a:spAutoFit/>
           </a:bodyPr>
           <a:lstStyle/>
@@ -3151,12 +3138,12 @@
       </p:sp>
       <p:sp>
         <p:nvSpPr>
-          <p:cNvPr name="TextBox 3" id="3"/>
-          <p:cNvSpPr txBox="true"/>
+          <p:cNvPr id="3" name="TextBox 3"/>
+          <p:cNvSpPr txBox="1"/>
           <p:nvPr/>
         </p:nvSpPr>
         <p:spPr>
-          <a:xfrm rot="0">
+          <a:xfrm>
             <a:off x="1028700" y="8272145"/>
             <a:ext cx="5913783" cy="986155"/>
           </a:xfrm>
@@ -3165,7 +3152,7 @@
           </a:prstGeom>
         </p:spPr>
         <p:txBody>
-          <a:bodyPr anchor="t" rtlCol="false" tIns="0" lIns="0" bIns="0" rIns="0">
+          <a:bodyPr lIns="0" tIns="0" rIns="0" bIns="0" rtlCol="0" anchor="t">
             <a:spAutoFit/>
           </a:bodyPr>
           <a:lstStyle/>
@@ -3205,12 +3192,12 @@
       </p:sp>
       <p:grpSp>
         <p:nvGrpSpPr>
-          <p:cNvPr name="Group 4" id="4"/>
+          <p:cNvPr id="4" name="Group 4"/>
           <p:cNvGrpSpPr/>
           <p:nvPr/>
         </p:nvGrpSpPr>
         <p:grpSpPr>
-          <a:xfrm rot="0">
+          <a:xfrm>
             <a:off x="16740784" y="0"/>
             <a:ext cx="1547216" cy="10287000"/>
             <a:chOff x="0" y="0"/>
@@ -3219,7 +3206,7 @@
         </p:grpSpPr>
         <p:sp>
           <p:nvSpPr>
-            <p:cNvPr name="Freeform 5" id="5"/>
+            <p:cNvPr id="5" name="Freeform 5"/>
             <p:cNvSpPr/>
             <p:nvPr/>
           </p:nvSpPr>
@@ -3233,9 +3220,9 @@
               <a:gdLst/>
               <a:ahLst/>
               <a:cxnLst/>
-              <a:rect r="r" b="b" t="t" l="l"/>
+              <a:rect l="l" t="t" r="r" b="b"/>
               <a:pathLst>
-                <a:path h="3479800" w="523379">
+                <a:path w="523379" h="3479800">
                   <a:moveTo>
                     <a:pt x="0" y="0"/>
                   </a:moveTo>
@@ -3260,12 +3247,12 @@
       </p:grpSp>
       <p:sp>
         <p:nvSpPr>
-          <p:cNvPr name="TextBox 6" id="6"/>
-          <p:cNvSpPr txBox="true"/>
+          <p:cNvPr id="6" name="TextBox 6"/>
+          <p:cNvSpPr txBox="1"/>
           <p:nvPr/>
         </p:nvSpPr>
         <p:spPr>
-          <a:xfrm rot="0">
+          <a:xfrm>
             <a:off x="570894" y="365669"/>
             <a:ext cx="3080540" cy="474312"/>
           </a:xfrm>
@@ -3274,7 +3261,7 @@
           </a:prstGeom>
         </p:spPr>
         <p:txBody>
-          <a:bodyPr anchor="t" rtlCol="false" tIns="0" lIns="0" bIns="0" rIns="0">
+          <a:bodyPr lIns="0" tIns="0" rIns="0" bIns="0" rtlCol="0" anchor="t">
             <a:spAutoFit/>
           </a:bodyPr>
           <a:lstStyle/>
@@ -3305,13 +3292,14 @@
 </file>
 
 <file path=ppt/slides/slide2.xml><?xml version="1.0" encoding="utf-8"?>
-<p:sld xmlns:p="http://schemas.openxmlformats.org/presentationml/2006/main" xmlns:a="http://schemas.openxmlformats.org/drawingml/2006/main">
+<p:sld xmlns:a="http://schemas.openxmlformats.org/drawingml/2006/main" xmlns:r="http://schemas.openxmlformats.org/officeDocument/2006/relationships" xmlns:p="http://schemas.openxmlformats.org/presentationml/2006/main">
   <p:cSld>
     <p:bg>
       <p:bgPr>
         <a:solidFill>
           <a:srgbClr val="EDE0D4"/>
         </a:solidFill>
+        <a:effectLst/>
       </p:bgPr>
     </p:bg>
     <p:spTree>
@@ -3330,12 +3318,12 @@
       </p:grpSpPr>
       <p:sp>
         <p:nvSpPr>
-          <p:cNvPr name="TextBox 2" id="2"/>
-          <p:cNvSpPr txBox="true"/>
+          <p:cNvPr id="2" name="TextBox 2"/>
+          <p:cNvSpPr txBox="1"/>
           <p:nvPr/>
         </p:nvSpPr>
         <p:spPr>
-          <a:xfrm rot="0">
+          <a:xfrm>
             <a:off x="1427653" y="1603763"/>
             <a:ext cx="6848808" cy="821055"/>
           </a:xfrm>
@@ -3344,7 +3332,7 @@
           </a:prstGeom>
         </p:spPr>
         <p:txBody>
-          <a:bodyPr anchor="t" rtlCol="false" tIns="0" lIns="0" bIns="0" rIns="0">
+          <a:bodyPr lIns="0" tIns="0" rIns="0" bIns="0" rtlCol="0" anchor="t">
             <a:spAutoFit/>
           </a:bodyPr>
           <a:lstStyle/>
@@ -3368,12 +3356,12 @@
       </p:sp>
       <p:sp>
         <p:nvSpPr>
-          <p:cNvPr name="TextBox 3" id="3"/>
-          <p:cNvSpPr txBox="true"/>
+          <p:cNvPr id="3" name="TextBox 3"/>
+          <p:cNvSpPr txBox="1"/>
           <p:nvPr/>
         </p:nvSpPr>
         <p:spPr>
-          <a:xfrm rot="0">
+          <a:xfrm>
             <a:off x="1028700" y="2708910"/>
             <a:ext cx="14064646" cy="4773930"/>
           </a:xfrm>
@@ -3382,12 +3370,12 @@
           </a:prstGeom>
         </p:spPr>
         <p:txBody>
-          <a:bodyPr anchor="t" rtlCol="false" tIns="0" lIns="0" bIns="0" rIns="0">
+          <a:bodyPr lIns="0" tIns="0" rIns="0" bIns="0" rtlCol="0" anchor="t">
             <a:spAutoFit/>
           </a:bodyPr>
           <a:lstStyle/>
           <a:p>
-            <a:pPr algn="just" marL="690877" indent="-345439" lvl="1">
+            <a:pPr marL="690877" lvl="1" indent="-345439" algn="just">
               <a:lnSpc>
                 <a:spcPts val="4799"/>
               </a:lnSpc>
@@ -3432,7 +3420,7 @@
             </a:r>
           </a:p>
           <a:p>
-            <a:pPr algn="just" marL="690877" indent="-345439" lvl="1">
+            <a:pPr marL="690877" lvl="1" indent="-345439" algn="just">
               <a:lnSpc>
                 <a:spcPts val="4799"/>
               </a:lnSpc>
@@ -3450,7 +3438,7 @@
             </a:r>
           </a:p>
           <a:p>
-            <a:pPr algn="just" marL="690877" indent="-345439" lvl="1">
+            <a:pPr marL="690877" lvl="1" indent="-345439" algn="just">
               <a:lnSpc>
                 <a:spcPts val="4799"/>
               </a:lnSpc>
@@ -3468,7 +3456,7 @@
             </a:r>
           </a:p>
           <a:p>
-            <a:pPr algn="just" marL="690877" indent="-345439" lvl="1">
+            <a:pPr marL="690877" lvl="1" indent="-345439" algn="just">
               <a:lnSpc>
                 <a:spcPts val="4799"/>
               </a:lnSpc>
@@ -3489,12 +3477,12 @@
       </p:sp>
       <p:grpSp>
         <p:nvGrpSpPr>
-          <p:cNvPr name="Group 4" id="4"/>
+          <p:cNvPr id="4" name="Group 4"/>
           <p:cNvGrpSpPr/>
           <p:nvPr/>
         </p:nvGrpSpPr>
         <p:grpSpPr>
-          <a:xfrm rot="0">
+          <a:xfrm>
             <a:off x="16740784" y="0"/>
             <a:ext cx="1547216" cy="10287000"/>
             <a:chOff x="0" y="0"/>
@@ -3503,7 +3491,7 @@
         </p:grpSpPr>
         <p:sp>
           <p:nvSpPr>
-            <p:cNvPr name="Freeform 5" id="5"/>
+            <p:cNvPr id="5" name="Freeform 5"/>
             <p:cNvSpPr/>
             <p:nvPr/>
           </p:nvSpPr>
@@ -3517,9 +3505,9 @@
               <a:gdLst/>
               <a:ahLst/>
               <a:cxnLst/>
-              <a:rect r="r" b="b" t="t" l="l"/>
+              <a:rect l="l" t="t" r="r" b="b"/>
               <a:pathLst>
-                <a:path h="3479800" w="523379">
+                <a:path w="523379" h="3479800">
                   <a:moveTo>
                     <a:pt x="0" y="0"/>
                   </a:moveTo>
@@ -3551,13 +3539,14 @@
 </file>
 
 <file path=ppt/slides/slide3.xml><?xml version="1.0" encoding="utf-8"?>
-<p:sld xmlns:p="http://schemas.openxmlformats.org/presentationml/2006/main" xmlns:a="http://schemas.openxmlformats.org/drawingml/2006/main">
+<p:sld xmlns:a="http://schemas.openxmlformats.org/drawingml/2006/main" xmlns:r="http://schemas.openxmlformats.org/officeDocument/2006/relationships" xmlns:p="http://schemas.openxmlformats.org/presentationml/2006/main">
   <p:cSld>
     <p:bg>
       <p:bgPr>
         <a:solidFill>
           <a:srgbClr val="EDE0D4"/>
         </a:solidFill>
+        <a:effectLst/>
       </p:bgPr>
     </p:bg>
     <p:spTree>
@@ -3576,12 +3565,12 @@
       </p:grpSpPr>
       <p:grpSp>
         <p:nvGrpSpPr>
-          <p:cNvPr name="Group 2" id="2"/>
+          <p:cNvPr id="2" name="Group 2"/>
           <p:cNvGrpSpPr/>
           <p:nvPr/>
         </p:nvGrpSpPr>
         <p:grpSpPr>
-          <a:xfrm rot="0">
+          <a:xfrm>
             <a:off x="16740784" y="0"/>
             <a:ext cx="1547216" cy="10287000"/>
             <a:chOff x="0" y="0"/>
@@ -3590,7 +3579,7 @@
         </p:grpSpPr>
         <p:sp>
           <p:nvSpPr>
-            <p:cNvPr name="Freeform 3" id="3"/>
+            <p:cNvPr id="3" name="Freeform 3"/>
             <p:cNvSpPr/>
             <p:nvPr/>
           </p:nvSpPr>
@@ -3604,9 +3593,9 @@
               <a:gdLst/>
               <a:ahLst/>
               <a:cxnLst/>
-              <a:rect r="r" b="b" t="t" l="l"/>
+              <a:rect l="l" t="t" r="r" b="b"/>
               <a:pathLst>
-                <a:path h="3479800" w="523379">
+                <a:path w="523379" h="3479800">
                   <a:moveTo>
                     <a:pt x="0" y="0"/>
                   </a:moveTo>
@@ -3631,12 +3620,12 @@
       </p:grpSp>
       <p:sp>
         <p:nvSpPr>
-          <p:cNvPr name="TextBox 4" id="4"/>
-          <p:cNvSpPr txBox="true"/>
+          <p:cNvPr id="4" name="TextBox 4"/>
+          <p:cNvSpPr txBox="1"/>
           <p:nvPr/>
         </p:nvSpPr>
         <p:spPr>
-          <a:xfrm rot="0">
+          <a:xfrm>
             <a:off x="1028700" y="1391256"/>
             <a:ext cx="9696120" cy="821055"/>
           </a:xfrm>
@@ -3645,7 +3634,7 @@
           </a:prstGeom>
         </p:spPr>
         <p:txBody>
-          <a:bodyPr anchor="t" rtlCol="false" tIns="0" lIns="0" bIns="0" rIns="0">
+          <a:bodyPr lIns="0" tIns="0" rIns="0" bIns="0" rtlCol="0" anchor="t">
             <a:spAutoFit/>
           </a:bodyPr>
           <a:lstStyle/>
@@ -3669,12 +3658,12 @@
       </p:sp>
       <p:sp>
         <p:nvSpPr>
-          <p:cNvPr name="TextBox 5" id="5"/>
-          <p:cNvSpPr txBox="true"/>
+          <p:cNvPr id="5" name="TextBox 5"/>
+          <p:cNvSpPr txBox="1"/>
           <p:nvPr/>
         </p:nvSpPr>
         <p:spPr>
-          <a:xfrm rot="0">
+          <a:xfrm>
             <a:off x="1028700" y="2440241"/>
             <a:ext cx="15001283" cy="5311267"/>
           </a:xfrm>
@@ -3683,7 +3672,7 @@
           </a:prstGeom>
         </p:spPr>
         <p:txBody>
-          <a:bodyPr anchor="t" rtlCol="false" tIns="0" lIns="0" bIns="0" rIns="0">
+          <a:bodyPr lIns="0" tIns="0" rIns="0" bIns="0" rtlCol="0" anchor="t">
             <a:spAutoFit/>
           </a:bodyPr>
           <a:lstStyle/>
@@ -3709,9 +3698,15 @@
                 <a:spcPts val="4227"/>
               </a:lnSpc>
             </a:pPr>
-          </a:p>
-          <a:p>
-            <a:pPr algn="just" marL="604519" indent="-302260" lvl="1">
+            <a:endParaRPr lang="en-US" sz="2799">
+              <a:solidFill>
+                <a:srgbClr val="804F3B"/>
+              </a:solidFill>
+              <a:latin typeface="Raleway"/>
+            </a:endParaRPr>
+          </a:p>
+          <a:p>
+            <a:pPr marL="604519" lvl="1" indent="-302260" algn="just">
               <a:lnSpc>
                 <a:spcPts val="4227"/>
               </a:lnSpc>
@@ -3729,7 +3724,7 @@
             </a:r>
           </a:p>
           <a:p>
-            <a:pPr algn="just" marL="604519" indent="-302260" lvl="1">
+            <a:pPr marL="604519" lvl="1" indent="-302260" algn="just">
               <a:lnSpc>
                 <a:spcPts val="4227"/>
               </a:lnSpc>
@@ -3752,6 +3747,12 @@
                 <a:spcPts val="4199"/>
               </a:lnSpc>
             </a:pPr>
+            <a:endParaRPr lang="en-US" sz="2799">
+              <a:solidFill>
+                <a:srgbClr val="804F3B"/>
+              </a:solidFill>
+              <a:latin typeface="Arimo"/>
+            </a:endParaRPr>
           </a:p>
         </p:txBody>
       </p:sp>
@@ -3764,13 +3765,14 @@
 </file>
 
 <file path=ppt/slides/slide4.xml><?xml version="1.0" encoding="utf-8"?>
-<p:sld xmlns:p="http://schemas.openxmlformats.org/presentationml/2006/main" xmlns:a="http://schemas.openxmlformats.org/drawingml/2006/main">
+<p:sld xmlns:a="http://schemas.openxmlformats.org/drawingml/2006/main" xmlns:r="http://schemas.openxmlformats.org/officeDocument/2006/relationships" xmlns:p="http://schemas.openxmlformats.org/presentationml/2006/main">
   <p:cSld>
     <p:bg>
       <p:bgPr>
         <a:solidFill>
           <a:srgbClr val="EDE0D4"/>
         </a:solidFill>
+        <a:effectLst/>
       </p:bgPr>
     </p:bg>
     <p:spTree>
@@ -3789,12 +3791,12 @@
       </p:grpSpPr>
       <p:grpSp>
         <p:nvGrpSpPr>
-          <p:cNvPr name="Group 2" id="2"/>
+          <p:cNvPr id="2" name="Group 2"/>
           <p:cNvGrpSpPr/>
           <p:nvPr/>
         </p:nvGrpSpPr>
         <p:grpSpPr>
-          <a:xfrm rot="0">
+          <a:xfrm>
             <a:off x="16740784" y="0"/>
             <a:ext cx="1547216" cy="10287000"/>
             <a:chOff x="0" y="0"/>
@@ -3803,7 +3805,7 @@
         </p:grpSpPr>
         <p:sp>
           <p:nvSpPr>
-            <p:cNvPr name="Freeform 3" id="3"/>
+            <p:cNvPr id="3" name="Freeform 3"/>
             <p:cNvSpPr/>
             <p:nvPr/>
           </p:nvSpPr>
@@ -3817,9 +3819,9 @@
               <a:gdLst/>
               <a:ahLst/>
               <a:cxnLst/>
-              <a:rect r="r" b="b" t="t" l="l"/>
+              <a:rect l="l" t="t" r="r" b="b"/>
               <a:pathLst>
-                <a:path h="3479800" w="523379">
+                <a:path w="523379" h="3479800">
                   <a:moveTo>
                     <a:pt x="0" y="0"/>
                   </a:moveTo>
@@ -3844,12 +3846,12 @@
       </p:grpSp>
       <p:sp>
         <p:nvSpPr>
-          <p:cNvPr name="TextBox 4" id="4"/>
-          <p:cNvSpPr txBox="true"/>
+          <p:cNvPr id="4" name="TextBox 4"/>
+          <p:cNvSpPr txBox="1"/>
           <p:nvPr/>
         </p:nvSpPr>
         <p:spPr>
-          <a:xfrm rot="0">
+          <a:xfrm>
             <a:off x="1028700" y="2253008"/>
             <a:ext cx="9696120" cy="821055"/>
           </a:xfrm>
@@ -3858,7 +3860,7 @@
           </a:prstGeom>
         </p:spPr>
         <p:txBody>
-          <a:bodyPr anchor="t" rtlCol="false" tIns="0" lIns="0" bIns="0" rIns="0">
+          <a:bodyPr lIns="0" tIns="0" rIns="0" bIns="0" rtlCol="0" anchor="t">
             <a:spAutoFit/>
           </a:bodyPr>
           <a:lstStyle/>
@@ -3882,12 +3884,12 @@
       </p:sp>
       <p:sp>
         <p:nvSpPr>
-          <p:cNvPr name="TextBox 5" id="5"/>
-          <p:cNvSpPr txBox="true"/>
+          <p:cNvPr id="5" name="TextBox 5"/>
+          <p:cNvSpPr txBox="1"/>
           <p:nvPr/>
         </p:nvSpPr>
         <p:spPr>
-          <a:xfrm rot="0">
+          <a:xfrm>
             <a:off x="1028700" y="3379851"/>
             <a:ext cx="14785845" cy="3403473"/>
           </a:xfrm>
@@ -3896,7 +3898,7 @@
           </a:prstGeom>
         </p:spPr>
         <p:txBody>
-          <a:bodyPr anchor="t" rtlCol="false" tIns="0" lIns="0" bIns="0" rIns="0">
+          <a:bodyPr lIns="0" tIns="0" rIns="0" bIns="0" rtlCol="0" anchor="t">
             <a:spAutoFit/>
           </a:bodyPr>
           <a:lstStyle/>
@@ -3938,6 +3940,12 @@
                 <a:spcPts val="4535"/>
               </a:lnSpc>
             </a:pPr>
+            <a:endParaRPr lang="en-US" sz="2799">
+              <a:solidFill>
+                <a:srgbClr val="804F3B"/>
+              </a:solidFill>
+              <a:latin typeface="Raleway"/>
+            </a:endParaRPr>
           </a:p>
         </p:txBody>
       </p:sp>
@@ -3950,13 +3958,14 @@
 </file>
 
 <file path=ppt/slides/slide5.xml><?xml version="1.0" encoding="utf-8"?>
-<p:sld xmlns:p="http://schemas.openxmlformats.org/presentationml/2006/main" xmlns:a="http://schemas.openxmlformats.org/drawingml/2006/main">
+<p:sld xmlns:a="http://schemas.openxmlformats.org/drawingml/2006/main" xmlns:r="http://schemas.openxmlformats.org/officeDocument/2006/relationships" xmlns:p="http://schemas.openxmlformats.org/presentationml/2006/main">
   <p:cSld>
     <p:bg>
       <p:bgPr>
         <a:solidFill>
           <a:srgbClr val="EDE0D4"/>
         </a:solidFill>
+        <a:effectLst/>
       </p:bgPr>
     </p:bg>
     <p:spTree>
@@ -3975,12 +3984,12 @@
       </p:grpSpPr>
       <p:sp>
         <p:nvSpPr>
-          <p:cNvPr name="TextBox 2" id="2"/>
-          <p:cNvSpPr txBox="true"/>
+          <p:cNvPr id="2" name="TextBox 2"/>
+          <p:cNvSpPr txBox="1"/>
           <p:nvPr/>
         </p:nvSpPr>
         <p:spPr>
-          <a:xfrm rot="0">
+          <a:xfrm>
             <a:off x="1028700" y="933450"/>
             <a:ext cx="11480727" cy="821055"/>
           </a:xfrm>
@@ -3989,7 +3998,7 @@
           </a:prstGeom>
         </p:spPr>
         <p:txBody>
-          <a:bodyPr anchor="t" rtlCol="false" tIns="0" lIns="0" bIns="0" rIns="0">
+          <a:bodyPr lIns="0" tIns="0" rIns="0" bIns="0" rtlCol="0" anchor="t">
             <a:spAutoFit/>
           </a:bodyPr>
           <a:lstStyle/>
@@ -4013,12 +4022,12 @@
       </p:sp>
       <p:grpSp>
         <p:nvGrpSpPr>
-          <p:cNvPr name="Group 3" id="3"/>
+          <p:cNvPr id="3" name="Group 3"/>
           <p:cNvGrpSpPr/>
           <p:nvPr/>
         </p:nvGrpSpPr>
         <p:grpSpPr>
-          <a:xfrm rot="0">
+          <a:xfrm>
             <a:off x="16740784" y="0"/>
             <a:ext cx="1547216" cy="10287000"/>
             <a:chOff x="0" y="0"/>
@@ -4027,7 +4036,7 @@
         </p:grpSpPr>
         <p:sp>
           <p:nvSpPr>
-            <p:cNvPr name="Freeform 4" id="4"/>
+            <p:cNvPr id="4" name="Freeform 4"/>
             <p:cNvSpPr/>
             <p:nvPr/>
           </p:nvSpPr>
@@ -4041,9 +4050,9 @@
               <a:gdLst/>
               <a:ahLst/>
               <a:cxnLst/>
-              <a:rect r="r" b="b" t="t" l="l"/>
+              <a:rect l="l" t="t" r="r" b="b"/>
               <a:pathLst>
-                <a:path h="3479800" w="523379">
+                <a:path w="523379" h="3479800">
                   <a:moveTo>
                     <a:pt x="0" y="0"/>
                   </a:moveTo>
@@ -4068,12 +4077,12 @@
       </p:grpSp>
       <p:sp>
         <p:nvSpPr>
-          <p:cNvPr name="TextBox 5" id="5"/>
-          <p:cNvSpPr txBox="true"/>
+          <p:cNvPr id="5" name="TextBox 5"/>
+          <p:cNvSpPr txBox="1"/>
           <p:nvPr/>
         </p:nvSpPr>
         <p:spPr>
-          <a:xfrm rot="0">
+          <a:xfrm>
             <a:off x="1028700" y="2258541"/>
             <a:ext cx="6326776" cy="632460"/>
           </a:xfrm>
@@ -4082,7 +4091,7 @@
           </a:prstGeom>
         </p:spPr>
         <p:txBody>
-          <a:bodyPr anchor="t" rtlCol="false" tIns="0" lIns="0" bIns="0" rIns="0">
+          <a:bodyPr lIns="0" tIns="0" rIns="0" bIns="0" rtlCol="0" anchor="t">
             <a:spAutoFit/>
           </a:bodyPr>
           <a:lstStyle/>
@@ -4106,12 +4115,12 @@
       </p:sp>
       <p:sp>
         <p:nvSpPr>
-          <p:cNvPr name="TextBox 6" id="6"/>
-          <p:cNvSpPr txBox="true"/>
+          <p:cNvPr id="6" name="TextBox 6"/>
+          <p:cNvSpPr txBox="1"/>
           <p:nvPr/>
         </p:nvSpPr>
         <p:spPr>
-          <a:xfrm rot="0">
+          <a:xfrm>
             <a:off x="1028700" y="2955856"/>
             <a:ext cx="6326776" cy="2074545"/>
           </a:xfrm>
@@ -4120,7 +4129,7 @@
           </a:prstGeom>
         </p:spPr>
         <p:txBody>
-          <a:bodyPr anchor="t" rtlCol="false" tIns="0" lIns="0" bIns="0" rIns="0">
+          <a:bodyPr lIns="0" tIns="0" rIns="0" bIns="0" rtlCol="0" anchor="t">
             <a:spAutoFit/>
           </a:bodyPr>
           <a:lstStyle/>
@@ -4144,12 +4153,12 @@
       </p:sp>
       <p:sp>
         <p:nvSpPr>
-          <p:cNvPr name="TextBox 7" id="7"/>
-          <p:cNvSpPr txBox="true"/>
+          <p:cNvPr id="7" name="TextBox 7"/>
+          <p:cNvSpPr txBox="1"/>
           <p:nvPr/>
         </p:nvSpPr>
         <p:spPr>
-          <a:xfrm rot="0">
+          <a:xfrm>
             <a:off x="9144000" y="2258541"/>
             <a:ext cx="6326776" cy="632460"/>
           </a:xfrm>
@@ -4158,7 +4167,7 @@
           </a:prstGeom>
         </p:spPr>
         <p:txBody>
-          <a:bodyPr anchor="t" rtlCol="false" tIns="0" lIns="0" bIns="0" rIns="0">
+          <a:bodyPr lIns="0" tIns="0" rIns="0" bIns="0" rtlCol="0" anchor="t">
             <a:spAutoFit/>
           </a:bodyPr>
           <a:lstStyle/>
@@ -4182,12 +4191,12 @@
       </p:sp>
       <p:sp>
         <p:nvSpPr>
-          <p:cNvPr name="TextBox 8" id="8"/>
-          <p:cNvSpPr txBox="true"/>
+          <p:cNvPr id="8" name="TextBox 8"/>
+          <p:cNvSpPr txBox="1"/>
           <p:nvPr/>
         </p:nvSpPr>
         <p:spPr>
-          <a:xfrm rot="0">
+          <a:xfrm>
             <a:off x="9144000" y="2955856"/>
             <a:ext cx="7080809" cy="2074545"/>
           </a:xfrm>
@@ -4196,7 +4205,7 @@
           </a:prstGeom>
         </p:spPr>
         <p:txBody>
-          <a:bodyPr anchor="t" rtlCol="false" tIns="0" lIns="0" bIns="0" rIns="0">
+          <a:bodyPr lIns="0" tIns="0" rIns="0" bIns="0" rtlCol="0" anchor="t">
             <a:spAutoFit/>
           </a:bodyPr>
           <a:lstStyle/>
@@ -4220,12 +4229,12 @@
       </p:sp>
       <p:sp>
         <p:nvSpPr>
-          <p:cNvPr name="TextBox 9" id="9"/>
-          <p:cNvSpPr txBox="true"/>
+          <p:cNvPr id="9" name="TextBox 9"/>
+          <p:cNvSpPr txBox="1"/>
           <p:nvPr/>
         </p:nvSpPr>
         <p:spPr>
-          <a:xfrm rot="0">
+          <a:xfrm>
             <a:off x="6532738" y="5488651"/>
             <a:ext cx="3633800" cy="632460"/>
           </a:xfrm>
@@ -4234,7 +4243,7 @@
           </a:prstGeom>
         </p:spPr>
         <p:txBody>
-          <a:bodyPr anchor="t" rtlCol="false" tIns="0" lIns="0" bIns="0" rIns="0">
+          <a:bodyPr lIns="0" tIns="0" rIns="0" bIns="0" rtlCol="0" anchor="t">
             <a:spAutoFit/>
           </a:bodyPr>
           <a:lstStyle/>
@@ -4258,12 +4267,12 @@
       </p:sp>
       <p:sp>
         <p:nvSpPr>
-          <p:cNvPr name="TextBox 10" id="10"/>
-          <p:cNvSpPr txBox="true"/>
+          <p:cNvPr id="10" name="TextBox 10"/>
+          <p:cNvSpPr txBox="1"/>
           <p:nvPr/>
         </p:nvSpPr>
         <p:spPr>
-          <a:xfrm rot="0">
+          <a:xfrm>
             <a:off x="5499040" y="6324513"/>
             <a:ext cx="6326776" cy="3122295"/>
           </a:xfrm>
@@ -4272,7 +4281,7 @@
           </a:prstGeom>
         </p:spPr>
         <p:txBody>
-          <a:bodyPr anchor="t" rtlCol="false" tIns="0" lIns="0" bIns="0" rIns="0">
+          <a:bodyPr lIns="0" tIns="0" rIns="0" bIns="0" rtlCol="0" anchor="t">
             <a:spAutoFit/>
           </a:bodyPr>
           <a:lstStyle/>
@@ -4319,13 +4328,14 @@
 </file>
 
 <file path=ppt/slides/slide6.xml><?xml version="1.0" encoding="utf-8"?>
-<p:sld xmlns:p="http://schemas.openxmlformats.org/presentationml/2006/main" xmlns:a="http://schemas.openxmlformats.org/drawingml/2006/main">
+<p:sld xmlns:a="http://schemas.openxmlformats.org/drawingml/2006/main" xmlns:r="http://schemas.openxmlformats.org/officeDocument/2006/relationships" xmlns:p="http://schemas.openxmlformats.org/presentationml/2006/main">
   <p:cSld>
     <p:bg>
       <p:bgPr>
         <a:solidFill>
           <a:srgbClr val="EDE0D4"/>
         </a:solidFill>
+        <a:effectLst/>
       </p:bgPr>
     </p:bg>
     <p:spTree>
@@ -4344,12 +4354,12 @@
       </p:grpSpPr>
       <p:grpSp>
         <p:nvGrpSpPr>
-          <p:cNvPr name="Group 2" id="2"/>
+          <p:cNvPr id="2" name="Group 2"/>
           <p:cNvGrpSpPr/>
           <p:nvPr/>
         </p:nvGrpSpPr>
         <p:grpSpPr>
-          <a:xfrm rot="0">
+          <a:xfrm>
             <a:off x="16740784" y="0"/>
             <a:ext cx="1547216" cy="10287000"/>
             <a:chOff x="0" y="0"/>
@@ -4358,7 +4368,7 @@
         </p:grpSpPr>
         <p:sp>
           <p:nvSpPr>
-            <p:cNvPr name="Freeform 3" id="3"/>
+            <p:cNvPr id="3" name="Freeform 3"/>
             <p:cNvSpPr/>
             <p:nvPr/>
           </p:nvSpPr>
@@ -4372,9 +4382,9 @@
               <a:gdLst/>
               <a:ahLst/>
               <a:cxnLst/>
-              <a:rect r="r" b="b" t="t" l="l"/>
+              <a:rect l="l" t="t" r="r" b="b"/>
               <a:pathLst>
-                <a:path h="3479800" w="523379">
+                <a:path w="523379" h="3479800">
                   <a:moveTo>
                     <a:pt x="0" y="0"/>
                   </a:moveTo>
@@ -4397,186 +4407,6 @@
           </p:spPr>
         </p:sp>
       </p:grpSp>
-      <p:grpSp>
-        <p:nvGrpSpPr>
-          <p:cNvPr name="Group 4" id="4"/>
-          <p:cNvGrpSpPr/>
-          <p:nvPr/>
-        </p:nvGrpSpPr>
-        <p:grpSpPr>
-          <a:xfrm rot="0">
-            <a:off x="3585617" y="3104900"/>
-            <a:ext cx="4077201" cy="4077201"/>
-            <a:chOff x="0" y="0"/>
-            <a:chExt cx="6350000" cy="6350000"/>
-          </a:xfrm>
-        </p:grpSpPr>
-        <p:sp>
-          <p:nvSpPr>
-            <p:cNvPr name="Freeform 5" id="5"/>
-            <p:cNvSpPr/>
-            <p:nvPr/>
-          </p:nvSpPr>
-          <p:spPr>
-            <a:xfrm>
-              <a:off x="14167" y="0"/>
-              <a:ext cx="6321665" cy="6350000"/>
-            </a:xfrm>
-            <a:custGeom>
-              <a:avLst/>
-              <a:gdLst/>
-              <a:ahLst/>
-              <a:cxnLst/>
-              <a:rect r="r" b="b" t="t" l="l"/>
-              <a:pathLst>
-                <a:path h="6350000" w="6321665">
-                  <a:moveTo>
-                    <a:pt x="3160833" y="0"/>
-                  </a:moveTo>
-                  <a:lnTo>
-                    <a:pt x="3160833" y="0"/>
-                  </a:lnTo>
-                  <a:cubicBezTo>
-                    <a:pt x="4908795" y="7817"/>
-                    <a:pt x="6321666" y="1427021"/>
-                    <a:pt x="6321666" y="3175000"/>
-                  </a:cubicBezTo>
-                  <a:cubicBezTo>
-                    <a:pt x="6321666" y="4922979"/>
-                    <a:pt x="4908795" y="6342183"/>
-                    <a:pt x="3160833" y="6350000"/>
-                  </a:cubicBezTo>
-                  <a:cubicBezTo>
-                    <a:pt x="1412871" y="6342183"/>
-                    <a:pt x="0" y="4922979"/>
-                    <a:pt x="0" y="3175000"/>
-                  </a:cubicBezTo>
-                  <a:cubicBezTo>
-                    <a:pt x="0" y="1427021"/>
-                    <a:pt x="1412871" y="7817"/>
-                    <a:pt x="3160833" y="0"/>
-                  </a:cubicBezTo>
-                  <a:close/>
-                </a:path>
-              </a:pathLst>
-            </a:custGeom>
-            <a:solidFill>
-              <a:srgbClr val="E6CCB2">
-                <a:alpha val="49804"/>
-              </a:srgbClr>
-            </a:solidFill>
-          </p:spPr>
-        </p:sp>
-      </p:grpSp>
-      <p:grpSp>
-        <p:nvGrpSpPr>
-          <p:cNvPr name="Group 6" id="6"/>
-          <p:cNvGrpSpPr/>
-          <p:nvPr/>
-        </p:nvGrpSpPr>
-        <p:grpSpPr>
-          <a:xfrm rot="0">
-            <a:off x="8699451" y="3104900"/>
-            <a:ext cx="4077201" cy="4077201"/>
-            <a:chOff x="0" y="0"/>
-            <a:chExt cx="6350000" cy="6350000"/>
-          </a:xfrm>
-        </p:grpSpPr>
-        <p:sp>
-          <p:nvSpPr>
-            <p:cNvPr name="Freeform 7" id="7"/>
-            <p:cNvSpPr/>
-            <p:nvPr/>
-          </p:nvSpPr>
-          <p:spPr>
-            <a:xfrm>
-              <a:off x="14167" y="0"/>
-              <a:ext cx="6321665" cy="6350000"/>
-            </a:xfrm>
-            <a:custGeom>
-              <a:avLst/>
-              <a:gdLst/>
-              <a:ahLst/>
-              <a:cxnLst/>
-              <a:rect r="r" b="b" t="t" l="l"/>
-              <a:pathLst>
-                <a:path h="6350000" w="6321665">
-                  <a:moveTo>
-                    <a:pt x="3160833" y="0"/>
-                  </a:moveTo>
-                  <a:lnTo>
-                    <a:pt x="3160833" y="0"/>
-                  </a:lnTo>
-                  <a:cubicBezTo>
-                    <a:pt x="4908795" y="7817"/>
-                    <a:pt x="6321666" y="1427021"/>
-                    <a:pt x="6321666" y="3175000"/>
-                  </a:cubicBezTo>
-                  <a:cubicBezTo>
-                    <a:pt x="6321666" y="4922979"/>
-                    <a:pt x="4908795" y="6342183"/>
-                    <a:pt x="3160833" y="6350000"/>
-                  </a:cubicBezTo>
-                  <a:cubicBezTo>
-                    <a:pt x="1412871" y="6342183"/>
-                    <a:pt x="0" y="4922979"/>
-                    <a:pt x="0" y="3175000"/>
-                  </a:cubicBezTo>
-                  <a:cubicBezTo>
-                    <a:pt x="0" y="1427021"/>
-                    <a:pt x="1412871" y="7817"/>
-                    <a:pt x="3160833" y="0"/>
-                  </a:cubicBezTo>
-                  <a:close/>
-                </a:path>
-              </a:pathLst>
-            </a:custGeom>
-            <a:solidFill>
-              <a:srgbClr val="E6CCB2">
-                <a:alpha val="49804"/>
-              </a:srgbClr>
-            </a:solidFill>
-          </p:spPr>
-        </p:sp>
-      </p:grpSp>
-      <p:sp>
-        <p:nvSpPr>
-          <p:cNvPr name="TextBox 8" id="8"/>
-          <p:cNvSpPr txBox="true"/>
-          <p:nvPr/>
-        </p:nvSpPr>
-        <p:spPr>
-          <a:xfrm rot="0">
-            <a:off x="1028700" y="933450"/>
-            <a:ext cx="6848808" cy="821055"/>
-          </a:xfrm>
-          <a:prstGeom prst="rect">
-            <a:avLst/>
-          </a:prstGeom>
-        </p:spPr>
-        <p:txBody>
-          <a:bodyPr anchor="t" rtlCol="false" tIns="0" lIns="0" bIns="0" rIns="0">
-            <a:spAutoFit/>
-          </a:bodyPr>
-          <a:lstStyle/>
-          <a:p>
-            <a:pPr>
-              <a:lnSpc>
-                <a:spcPts val="6719"/>
-              </a:lnSpc>
-            </a:pPr>
-            <a:r>
-              <a:rPr lang="en-US" sz="4800">
-                <a:solidFill>
-                  <a:srgbClr val="804F3B"/>
-                </a:solidFill>
-                <a:latin typeface="Radley Bold"/>
-              </a:rPr>
-              <a:t>Our Team</a:t>
-            </a:r>
-          </a:p>
-        </p:txBody>
-      </p:sp>
     </p:spTree>
   </p:cSld>
   <p:clrMapOvr>
@@ -4586,13 +4416,14 @@
 </file>
 
 <file path=ppt/slides/slide7.xml><?xml version="1.0" encoding="utf-8"?>
-<p:sld xmlns:p="http://schemas.openxmlformats.org/presentationml/2006/main" xmlns:a="http://schemas.openxmlformats.org/drawingml/2006/main">
+<p:sld xmlns:a="http://schemas.openxmlformats.org/drawingml/2006/main" xmlns:r="http://schemas.openxmlformats.org/officeDocument/2006/relationships" xmlns:p="http://schemas.openxmlformats.org/presentationml/2006/main">
   <p:cSld>
     <p:bg>
       <p:bgPr>
         <a:solidFill>
           <a:srgbClr val="EDE0D4"/>
         </a:solidFill>
+        <a:effectLst/>
       </p:bgPr>
     </p:bg>
     <p:spTree>
@@ -4609,280 +4440,14 @@
           <a:chExt cx="0" cy="0"/>
         </a:xfrm>
       </p:grpSpPr>
-      <p:sp>
-        <p:nvSpPr>
-          <p:cNvPr name="TextBox 2" id="2"/>
-          <p:cNvSpPr txBox="true"/>
-          <p:nvPr/>
-        </p:nvSpPr>
-        <p:spPr>
-          <a:xfrm rot="0">
-            <a:off x="1028700" y="3535089"/>
-            <a:ext cx="3545891" cy="632460"/>
-          </a:xfrm>
-          <a:prstGeom prst="rect">
-            <a:avLst/>
-          </a:prstGeom>
-        </p:spPr>
-        <p:txBody>
-          <a:bodyPr anchor="t" rtlCol="false" tIns="0" lIns="0" bIns="0" rIns="0">
-            <a:spAutoFit/>
-          </a:bodyPr>
-          <a:lstStyle/>
-          <a:p>
-            <a:pPr>
-              <a:lnSpc>
-                <a:spcPts val="5040"/>
-              </a:lnSpc>
-            </a:pPr>
-            <a:r>
-              <a:rPr lang="en-US" sz="3600">
-                <a:solidFill>
-                  <a:srgbClr val="804F3B"/>
-                </a:solidFill>
-                <a:latin typeface="Raleway Bold"/>
-              </a:rPr>
-              <a:t>Name</a:t>
-            </a:r>
-          </a:p>
-        </p:txBody>
-      </p:sp>
-      <p:sp>
-        <p:nvSpPr>
-          <p:cNvPr name="TextBox 3" id="3"/>
-          <p:cNvSpPr txBox="true"/>
-          <p:nvPr/>
-        </p:nvSpPr>
-        <p:spPr>
-          <a:xfrm rot="0">
-            <a:off x="1028700" y="4564380"/>
-            <a:ext cx="3545891" cy="4170045"/>
-          </a:xfrm>
-          <a:prstGeom prst="rect">
-            <a:avLst/>
-          </a:prstGeom>
-        </p:spPr>
-        <p:txBody>
-          <a:bodyPr anchor="t" rtlCol="false" tIns="0" lIns="0" bIns="0" rIns="0">
-            <a:spAutoFit/>
-          </a:bodyPr>
-          <a:lstStyle/>
-          <a:p>
-            <a:pPr algn="just">
-              <a:lnSpc>
-                <a:spcPts val="4199"/>
-              </a:lnSpc>
-            </a:pPr>
-            <a:r>
-              <a:rPr lang="en-US" sz="2799">
-                <a:solidFill>
-                  <a:srgbClr val="804F3B"/>
-                </a:solidFill>
-                <a:latin typeface="Raleway"/>
-              </a:rPr>
-              <a:t>Lorem ipsum dolor sit amet, consectetur adipiscing elit, sed do eiusmod tempor incididunt ut labore et dolore magna aliqua. Ut enim ad minim veniam.</a:t>
-            </a:r>
-          </a:p>
-        </p:txBody>
-      </p:sp>
-      <p:sp>
-        <p:nvSpPr>
-          <p:cNvPr name="TextBox 4" id="4"/>
-          <p:cNvSpPr txBox="true"/>
-          <p:nvPr/>
-        </p:nvSpPr>
-        <p:spPr>
-          <a:xfrm rot="0">
-            <a:off x="6422298" y="3535089"/>
-            <a:ext cx="3545891" cy="632460"/>
-          </a:xfrm>
-          <a:prstGeom prst="rect">
-            <a:avLst/>
-          </a:prstGeom>
-        </p:spPr>
-        <p:txBody>
-          <a:bodyPr anchor="t" rtlCol="false" tIns="0" lIns="0" bIns="0" rIns="0">
-            <a:spAutoFit/>
-          </a:bodyPr>
-          <a:lstStyle/>
-          <a:p>
-            <a:pPr>
-              <a:lnSpc>
-                <a:spcPts val="5040"/>
-              </a:lnSpc>
-            </a:pPr>
-            <a:r>
-              <a:rPr lang="en-US" sz="3600">
-                <a:solidFill>
-                  <a:srgbClr val="804F3B"/>
-                </a:solidFill>
-                <a:latin typeface="Raleway Bold"/>
-              </a:rPr>
-              <a:t>Name</a:t>
-            </a:r>
-          </a:p>
-        </p:txBody>
-      </p:sp>
-      <p:sp>
-        <p:nvSpPr>
-          <p:cNvPr name="TextBox 5" id="5"/>
-          <p:cNvSpPr txBox="true"/>
-          <p:nvPr/>
-        </p:nvSpPr>
-        <p:spPr>
-          <a:xfrm rot="0">
-            <a:off x="6422298" y="4564380"/>
-            <a:ext cx="3545891" cy="4693920"/>
-          </a:xfrm>
-          <a:prstGeom prst="rect">
-            <a:avLst/>
-          </a:prstGeom>
-        </p:spPr>
-        <p:txBody>
-          <a:bodyPr anchor="t" rtlCol="false" tIns="0" lIns="0" bIns="0" rIns="0">
-            <a:spAutoFit/>
-          </a:bodyPr>
-          <a:lstStyle/>
-          <a:p>
-            <a:pPr algn="just">
-              <a:lnSpc>
-                <a:spcPts val="4199"/>
-              </a:lnSpc>
-            </a:pPr>
-            <a:r>
-              <a:rPr lang="en-US" sz="2799">
-                <a:solidFill>
-                  <a:srgbClr val="804F3B"/>
-                </a:solidFill>
-                <a:latin typeface="Raleway"/>
-              </a:rPr>
-              <a:t>Lorem ipsum dolor sit amet, consectetur adipiscing elit, sed do eiusmod tempor incididunt ut labore et dolore magna aliqua. Ut enim ad minim veniam, quis nostrud exercitation.</a:t>
-            </a:r>
-          </a:p>
-        </p:txBody>
-      </p:sp>
-      <p:sp>
-        <p:nvSpPr>
-          <p:cNvPr name="TextBox 6" id="6"/>
-          <p:cNvSpPr txBox="true"/>
-          <p:nvPr/>
-        </p:nvSpPr>
-        <p:spPr>
-          <a:xfrm rot="0">
-            <a:off x="11924885" y="3535089"/>
-            <a:ext cx="3545891" cy="632460"/>
-          </a:xfrm>
-          <a:prstGeom prst="rect">
-            <a:avLst/>
-          </a:prstGeom>
-        </p:spPr>
-        <p:txBody>
-          <a:bodyPr anchor="t" rtlCol="false" tIns="0" lIns="0" bIns="0" rIns="0">
-            <a:spAutoFit/>
-          </a:bodyPr>
-          <a:lstStyle/>
-          <a:p>
-            <a:pPr>
-              <a:lnSpc>
-                <a:spcPts val="5040"/>
-              </a:lnSpc>
-            </a:pPr>
-            <a:r>
-              <a:rPr lang="en-US" sz="3600">
-                <a:solidFill>
-                  <a:srgbClr val="804F3B"/>
-                </a:solidFill>
-                <a:latin typeface="Raleway Bold"/>
-              </a:rPr>
-              <a:t>Name</a:t>
-            </a:r>
-          </a:p>
-        </p:txBody>
-      </p:sp>
-      <p:sp>
-        <p:nvSpPr>
-          <p:cNvPr name="TextBox 7" id="7"/>
-          <p:cNvSpPr txBox="true"/>
-          <p:nvPr/>
-        </p:nvSpPr>
-        <p:spPr>
-          <a:xfrm rot="0">
-            <a:off x="11924885" y="4564380"/>
-            <a:ext cx="3545891" cy="3646170"/>
-          </a:xfrm>
-          <a:prstGeom prst="rect">
-            <a:avLst/>
-          </a:prstGeom>
-        </p:spPr>
-        <p:txBody>
-          <a:bodyPr anchor="t" rtlCol="false" tIns="0" lIns="0" bIns="0" rIns="0">
-            <a:spAutoFit/>
-          </a:bodyPr>
-          <a:lstStyle/>
-          <a:p>
-            <a:pPr algn="just">
-              <a:lnSpc>
-                <a:spcPts val="4199"/>
-              </a:lnSpc>
-            </a:pPr>
-            <a:r>
-              <a:rPr lang="en-US" sz="2799">
-                <a:solidFill>
-                  <a:srgbClr val="804F3B"/>
-                </a:solidFill>
-                <a:latin typeface="Raleway"/>
-              </a:rPr>
-              <a:t>Lorem ipsum dolor sit amet, consectetur adipiscing elit, sed do eiusmod tempor incididunt ut labore et dolore magna aliqua. </a:t>
-            </a:r>
-          </a:p>
-        </p:txBody>
-      </p:sp>
-      <p:sp>
-        <p:nvSpPr>
-          <p:cNvPr name="TextBox 8" id="8"/>
-          <p:cNvSpPr txBox="true"/>
-          <p:nvPr/>
-        </p:nvSpPr>
-        <p:spPr>
-          <a:xfrm rot="0">
-            <a:off x="1028700" y="933450"/>
-            <a:ext cx="6848808" cy="821055"/>
-          </a:xfrm>
-          <a:prstGeom prst="rect">
-            <a:avLst/>
-          </a:prstGeom>
-        </p:spPr>
-        <p:txBody>
-          <a:bodyPr anchor="t" rtlCol="false" tIns="0" lIns="0" bIns="0" rIns="0">
-            <a:spAutoFit/>
-          </a:bodyPr>
-          <a:lstStyle/>
-          <a:p>
-            <a:pPr>
-              <a:lnSpc>
-                <a:spcPts val="6719"/>
-              </a:lnSpc>
-            </a:pPr>
-            <a:r>
-              <a:rPr lang="en-US" sz="4800">
-                <a:solidFill>
-                  <a:srgbClr val="804F3B"/>
-                </a:solidFill>
-                <a:latin typeface="Radley Bold"/>
-              </a:rPr>
-              <a:t>Phases</a:t>
-            </a:r>
-          </a:p>
-        </p:txBody>
-      </p:sp>
       <p:grpSp>
         <p:nvGrpSpPr>
-          <p:cNvPr name="Group 9" id="9"/>
+          <p:cNvPr id="9" name="Group 9"/>
           <p:cNvGrpSpPr/>
           <p:nvPr/>
         </p:nvGrpSpPr>
         <p:grpSpPr>
-          <a:xfrm rot="0">
+          <a:xfrm>
             <a:off x="16740784" y="0"/>
             <a:ext cx="1547216" cy="10287000"/>
             <a:chOff x="0" y="0"/>
@@ -4891,7 +4456,7 @@
         </p:grpSpPr>
         <p:sp>
           <p:nvSpPr>
-            <p:cNvPr name="Freeform 10" id="10"/>
+            <p:cNvPr id="10" name="Freeform 10"/>
             <p:cNvSpPr/>
             <p:nvPr/>
           </p:nvSpPr>
@@ -4905,9 +4470,9 @@
               <a:gdLst/>
               <a:ahLst/>
               <a:cxnLst/>
-              <a:rect r="r" b="b" t="t" l="l"/>
+              <a:rect l="l" t="t" r="r" b="b"/>
               <a:pathLst>
-                <a:path h="3479800" w="523379">
+                <a:path w="523379" h="3479800">
                   <a:moveTo>
                     <a:pt x="0" y="0"/>
                   </a:moveTo>
@@ -4930,44 +4495,6 @@
           </p:spPr>
         </p:sp>
       </p:grpSp>
-      <p:sp>
-        <p:nvSpPr>
-          <p:cNvPr name="TextBox 11" id="11"/>
-          <p:cNvSpPr txBox="true"/>
-          <p:nvPr/>
-        </p:nvSpPr>
-        <p:spPr>
-          <a:xfrm rot="0">
-            <a:off x="17127588" y="9201150"/>
-            <a:ext cx="773608" cy="537845"/>
-          </a:xfrm>
-          <a:prstGeom prst="rect">
-            <a:avLst/>
-          </a:prstGeom>
-        </p:spPr>
-        <p:txBody>
-          <a:bodyPr anchor="t" rtlCol="false" tIns="0" lIns="0" bIns="0" rIns="0">
-            <a:spAutoFit/>
-          </a:bodyPr>
-          <a:lstStyle/>
-          <a:p>
-            <a:pPr algn="ctr">
-              <a:lnSpc>
-                <a:spcPts val="4480"/>
-              </a:lnSpc>
-            </a:pPr>
-            <a:r>
-              <a:rPr lang="en-US" sz="3200">
-                <a:solidFill>
-                  <a:srgbClr val="804F3B"/>
-                </a:solidFill>
-                <a:latin typeface="Prata"/>
-              </a:rPr>
-              <a:t>6</a:t>
-            </a:r>
-          </a:p>
-        </p:txBody>
-      </p:sp>
     </p:spTree>
   </p:cSld>
   <p:clrMapOvr>
@@ -4977,13 +4504,14 @@
 </file>
 
 <file path=ppt/slides/slide8.xml><?xml version="1.0" encoding="utf-8"?>
-<p:sld xmlns:p="http://schemas.openxmlformats.org/presentationml/2006/main" xmlns:a="http://schemas.openxmlformats.org/drawingml/2006/main">
+<p:sld xmlns:a="http://schemas.openxmlformats.org/drawingml/2006/main" xmlns:r="http://schemas.openxmlformats.org/officeDocument/2006/relationships" xmlns:p="http://schemas.openxmlformats.org/presentationml/2006/main">
   <p:cSld>
     <p:bg>
       <p:bgPr>
         <a:solidFill>
           <a:srgbClr val="EDE0D4"/>
         </a:solidFill>
+        <a:effectLst/>
       </p:bgPr>
     </p:bg>
     <p:spTree>
@@ -5002,12 +4530,12 @@
       </p:grpSpPr>
       <p:sp>
         <p:nvSpPr>
-          <p:cNvPr name="TextBox 2" id="2"/>
-          <p:cNvSpPr txBox="true"/>
+          <p:cNvPr id="2" name="TextBox 2"/>
+          <p:cNvSpPr txBox="1"/>
           <p:nvPr/>
         </p:nvSpPr>
         <p:spPr>
-          <a:xfrm rot="0">
+          <a:xfrm>
             <a:off x="1028700" y="4288155"/>
             <a:ext cx="7663287" cy="1600200"/>
           </a:xfrm>
@@ -5016,7 +4544,7 @@
           </a:prstGeom>
         </p:spPr>
         <p:txBody>
-          <a:bodyPr anchor="t" rtlCol="false" tIns="0" lIns="0" bIns="0" rIns="0">
+          <a:bodyPr lIns="0" tIns="0" rIns="0" bIns="0" rtlCol="0" anchor="t">
             <a:spAutoFit/>
           </a:bodyPr>
           <a:lstStyle/>
@@ -5040,12 +4568,12 @@
       </p:sp>
       <p:grpSp>
         <p:nvGrpSpPr>
-          <p:cNvPr name="Group 3" id="3"/>
+          <p:cNvPr id="3" name="Group 3"/>
           <p:cNvGrpSpPr/>
           <p:nvPr/>
         </p:nvGrpSpPr>
         <p:grpSpPr>
-          <a:xfrm rot="0">
+          <a:xfrm>
             <a:off x="16740784" y="0"/>
             <a:ext cx="1547216" cy="10287000"/>
             <a:chOff x="0" y="0"/>
@@ -5054,7 +4582,7 @@
         </p:grpSpPr>
         <p:sp>
           <p:nvSpPr>
-            <p:cNvPr name="Freeform 4" id="4"/>
+            <p:cNvPr id="4" name="Freeform 4"/>
             <p:cNvSpPr/>
             <p:nvPr/>
           </p:nvSpPr>
@@ -5068,9 +4596,9 @@
               <a:gdLst/>
               <a:ahLst/>
               <a:cxnLst/>
-              <a:rect r="r" b="b" t="t" l="l"/>
+              <a:rect l="l" t="t" r="r" b="b"/>
               <a:pathLst>
-                <a:path h="3479800" w="523379">
+                <a:path w="523379" h="3479800">
                   <a:moveTo>
                     <a:pt x="0" y="0"/>
                   </a:moveTo>

</xml_diff>